<commit_message>
aggiunti file per la presentazione
</commit_message>
<xml_diff>
--- a/fileEsame/presentation.pptx
+++ b/fileEsame/presentation.pptx
@@ -20,7 +20,11 @@
     <p:sldId id="267" r:id="rId14"/>
     <p:sldId id="268" r:id="rId15"/>
     <p:sldId id="269" r:id="rId16"/>
-    <p:sldId id="257" r:id="rId17"/>
+    <p:sldId id="273" r:id="rId17"/>
+    <p:sldId id="272" r:id="rId18"/>
+    <p:sldId id="274" r:id="rId19"/>
+    <p:sldId id="275" r:id="rId20"/>
+    <p:sldId id="257" r:id="rId21"/>
   </p:sldIdLst>
   <p:sldSz cx="12192000" cy="6858000"/>
   <p:notesSz cx="6858000" cy="9144000"/>
@@ -119,6 +123,11 @@
       </a:defRPr>
     </a:lvl9pPr>
   </p:defaultTextStyle>
+  <p:extLst>
+    <p:ext uri="{EFAFB233-063F-42B5-8137-9DF3F51BA10A}">
+      <p15:sldGuideLst xmlns:p15="http://schemas.microsoft.com/office/powerpoint/2012/main"/>
+    </p:ext>
+  </p:extLst>
 </p:presentation>
 </file>
 
@@ -269,7 +278,7 @@
           <a:p>
             <a:fld id="{74950A97-79D1-4BAA-8C1A-C26D640840E8}" type="datetimeFigureOut">
               <a:rPr lang="it-IT" smtClean="0"/>
-              <a:t>04/06/2025</a:t>
+              <a:t>07/06/2025</a:t>
             </a:fld>
             <a:endParaRPr lang="it-IT"/>
           </a:p>
@@ -467,7 +476,7 @@
           <a:p>
             <a:fld id="{74950A97-79D1-4BAA-8C1A-C26D640840E8}" type="datetimeFigureOut">
               <a:rPr lang="it-IT" smtClean="0"/>
-              <a:t>04/06/2025</a:t>
+              <a:t>07/06/2025</a:t>
             </a:fld>
             <a:endParaRPr lang="it-IT"/>
           </a:p>
@@ -675,7 +684,7 @@
           <a:p>
             <a:fld id="{74950A97-79D1-4BAA-8C1A-C26D640840E8}" type="datetimeFigureOut">
               <a:rPr lang="it-IT" smtClean="0"/>
-              <a:t>04/06/2025</a:t>
+              <a:t>07/06/2025</a:t>
             </a:fld>
             <a:endParaRPr lang="it-IT"/>
           </a:p>
@@ -873,7 +882,7 @@
           <a:p>
             <a:fld id="{74950A97-79D1-4BAA-8C1A-C26D640840E8}" type="datetimeFigureOut">
               <a:rPr lang="it-IT" smtClean="0"/>
-              <a:t>04/06/2025</a:t>
+              <a:t>07/06/2025</a:t>
             </a:fld>
             <a:endParaRPr lang="it-IT"/>
           </a:p>
@@ -1148,7 +1157,7 @@
           <a:p>
             <a:fld id="{74950A97-79D1-4BAA-8C1A-C26D640840E8}" type="datetimeFigureOut">
               <a:rPr lang="it-IT" smtClean="0"/>
-              <a:t>04/06/2025</a:t>
+              <a:t>07/06/2025</a:t>
             </a:fld>
             <a:endParaRPr lang="it-IT"/>
           </a:p>
@@ -1413,7 +1422,7 @@
           <a:p>
             <a:fld id="{74950A97-79D1-4BAA-8C1A-C26D640840E8}" type="datetimeFigureOut">
               <a:rPr lang="it-IT" smtClean="0"/>
-              <a:t>04/06/2025</a:t>
+              <a:t>07/06/2025</a:t>
             </a:fld>
             <a:endParaRPr lang="it-IT"/>
           </a:p>
@@ -1825,7 +1834,7 @@
           <a:p>
             <a:fld id="{74950A97-79D1-4BAA-8C1A-C26D640840E8}" type="datetimeFigureOut">
               <a:rPr lang="it-IT" smtClean="0"/>
-              <a:t>04/06/2025</a:t>
+              <a:t>07/06/2025</a:t>
             </a:fld>
             <a:endParaRPr lang="it-IT"/>
           </a:p>
@@ -1966,7 +1975,7 @@
           <a:p>
             <a:fld id="{74950A97-79D1-4BAA-8C1A-C26D640840E8}" type="datetimeFigureOut">
               <a:rPr lang="it-IT" smtClean="0"/>
-              <a:t>04/06/2025</a:t>
+              <a:t>07/06/2025</a:t>
             </a:fld>
             <a:endParaRPr lang="it-IT"/>
           </a:p>
@@ -2079,7 +2088,7 @@
           <a:p>
             <a:fld id="{74950A97-79D1-4BAA-8C1A-C26D640840E8}" type="datetimeFigureOut">
               <a:rPr lang="it-IT" smtClean="0"/>
-              <a:t>04/06/2025</a:t>
+              <a:t>07/06/2025</a:t>
             </a:fld>
             <a:endParaRPr lang="it-IT"/>
           </a:p>
@@ -2390,7 +2399,7 @@
           <a:p>
             <a:fld id="{74950A97-79D1-4BAA-8C1A-C26D640840E8}" type="datetimeFigureOut">
               <a:rPr lang="it-IT" smtClean="0"/>
-              <a:t>04/06/2025</a:t>
+              <a:t>07/06/2025</a:t>
             </a:fld>
             <a:endParaRPr lang="it-IT"/>
           </a:p>
@@ -2678,7 +2687,7 @@
           <a:p>
             <a:fld id="{74950A97-79D1-4BAA-8C1A-C26D640840E8}" type="datetimeFigureOut">
               <a:rPr lang="it-IT" smtClean="0"/>
-              <a:t>04/06/2025</a:t>
+              <a:t>07/06/2025</a:t>
             </a:fld>
             <a:endParaRPr lang="it-IT"/>
           </a:p>
@@ -2919,7 +2928,7 @@
           <a:p>
             <a:fld id="{74950A97-79D1-4BAA-8C1A-C26D640840E8}" type="datetimeFigureOut">
               <a:rPr lang="it-IT" smtClean="0"/>
-              <a:t>04/06/2025</a:t>
+              <a:t>07/06/2025</a:t>
             </a:fld>
             <a:endParaRPr lang="it-IT"/>
           </a:p>
@@ -4225,7 +4234,12 @@
             <p:ph idx="1"/>
           </p:nvPr>
         </p:nvSpPr>
-        <p:spPr/>
+        <p:spPr>
+          <a:xfrm>
+            <a:off x="838200" y="2506662"/>
+            <a:ext cx="10515600" cy="4351338"/>
+          </a:xfrm>
+        </p:spPr>
         <p:txBody>
           <a:bodyPr/>
           <a:lstStyle/>
@@ -4272,6 +4286,9 @@
               </a:rPr>
               <a:t>LINK_DATASET</a:t>
             </a:r>
+            <a:endParaRPr lang="en-US" dirty="0"/>
+          </a:p>
+          <a:p>
             <a:endParaRPr lang="en-US" dirty="0"/>
           </a:p>
           <a:p>
@@ -4322,7 +4339,7 @@
           <p:cNvPr id="2" name="Titolo 1">
             <a:extLst>
               <a:ext uri="{FF2B5EF4-FFF2-40B4-BE49-F238E27FC236}">
-                <a16:creationId xmlns:a16="http://schemas.microsoft.com/office/drawing/2014/main" id="{FE90BB19-32AB-57C3-5FC0-A0E01336BA97}"/>
+                <a16:creationId xmlns:a16="http://schemas.microsoft.com/office/drawing/2014/main" id="{245F86AA-D067-F1B8-0D77-7EDE4C0C5DCB}"/>
               </a:ext>
             </a:extLst>
           </p:cNvPr>
@@ -4339,113 +4356,629 @@
           <a:lstStyle/>
           <a:p>
             <a:r>
-              <a:rPr lang="en-US" dirty="0" err="1"/>
-              <a:t>Bibliografia</a:t>
+              <a:rPr lang="en-US" dirty="0"/>
+              <a:t>RISULTATI QUANTITATIVI</a:t>
             </a:r>
             <a:endParaRPr lang="it-IT" dirty="0"/>
           </a:p>
         </p:txBody>
       </p:sp>
-      <p:sp>
-        <p:nvSpPr>
-          <p:cNvPr id="3" name="Segnaposto contenuto 2">
-            <a:extLst>
-              <a:ext uri="{FF2B5EF4-FFF2-40B4-BE49-F238E27FC236}">
-                <a16:creationId xmlns:a16="http://schemas.microsoft.com/office/drawing/2014/main" id="{50DAF559-DD37-A7C0-60EC-129E30133D07}"/>
-              </a:ext>
-            </a:extLst>
-          </p:cNvPr>
-          <p:cNvSpPr>
-            <a:spLocks noGrp="1"/>
-          </p:cNvSpPr>
+      <p:pic>
+        <p:nvPicPr>
+          <p:cNvPr id="5" name="Segnaposto contenuto 4" descr="Immagine che contiene testo, schermata, numero, Parallelo&#10;&#10;Il contenuto generato dall'IA potrebbe non essere corretto.">
+            <a:extLst>
+              <a:ext uri="{FF2B5EF4-FFF2-40B4-BE49-F238E27FC236}">
+                <a16:creationId xmlns:a16="http://schemas.microsoft.com/office/drawing/2014/main" id="{0F9F7ACB-E745-7569-B407-8956CC4137E4}"/>
+              </a:ext>
+            </a:extLst>
+          </p:cNvPr>
+          <p:cNvPicPr>
+            <a:picLocks noGrp="1" noChangeAspect="1"/>
+          </p:cNvPicPr>
           <p:nvPr>
             <p:ph idx="1"/>
           </p:nvPr>
-        </p:nvSpPr>
-        <p:spPr/>
-        <p:txBody>
-          <a:bodyPr/>
-          <a:lstStyle/>
-          <a:p>
-            <a:r>
-              <a:rPr lang="it-IT" dirty="0"/>
-              <a:t>Yang, </a:t>
-            </a:r>
-            <a:r>
-              <a:rPr lang="it-IT" dirty="0" err="1"/>
-              <a:t>Yixin</a:t>
-            </a:r>
-            <a:r>
-              <a:rPr lang="it-IT" dirty="0"/>
-              <a:t>, et al. "</a:t>
-            </a:r>
-            <a:r>
-              <a:rPr lang="it-IT" dirty="0" err="1"/>
-              <a:t>ColorMNet</a:t>
-            </a:r>
-            <a:r>
-              <a:rPr lang="it-IT" dirty="0"/>
-              <a:t>: A </a:t>
-            </a:r>
-            <a:r>
-              <a:rPr lang="it-IT" dirty="0" err="1"/>
-              <a:t>memory-based</a:t>
-            </a:r>
-            <a:r>
-              <a:rPr lang="it-IT" dirty="0"/>
-              <a:t> deep </a:t>
-            </a:r>
-            <a:r>
-              <a:rPr lang="it-IT" dirty="0" err="1"/>
-              <a:t>spatial-temporal</a:t>
-            </a:r>
-            <a:r>
-              <a:rPr lang="it-IT" dirty="0"/>
-              <a:t> feature </a:t>
-            </a:r>
-            <a:r>
-              <a:rPr lang="it-IT" dirty="0" err="1"/>
-              <a:t>propagation</a:t>
-            </a:r>
-            <a:r>
-              <a:rPr lang="it-IT" dirty="0"/>
-              <a:t> network for video </a:t>
-            </a:r>
-            <a:r>
-              <a:rPr lang="it-IT" dirty="0" err="1"/>
-              <a:t>colorization</a:t>
-            </a:r>
-            <a:r>
-              <a:rPr lang="it-IT" dirty="0"/>
-              <a:t>." </a:t>
-            </a:r>
-            <a:r>
-              <a:rPr lang="it-IT" i="1" dirty="0" err="1"/>
-              <a:t>European</a:t>
-            </a:r>
-            <a:r>
-              <a:rPr lang="it-IT" i="1" dirty="0"/>
-              <a:t> Conference on Computer Vision</a:t>
-            </a:r>
-            <a:r>
-              <a:rPr lang="it-IT" dirty="0"/>
-              <a:t>. Cham: Springer Nature </a:t>
-            </a:r>
-            <a:r>
-              <a:rPr lang="it-IT" dirty="0" err="1"/>
-              <a:t>Switzerland</a:t>
-            </a:r>
-            <a:r>
-              <a:rPr lang="it-IT" dirty="0"/>
-              <a:t>, 2024.</a:t>
-            </a:r>
-          </a:p>
-        </p:txBody>
-      </p:sp>
+        </p:nvPicPr>
+        <p:blipFill>
+          <a:blip r:embed="rId2">
+            <a:extLst>
+              <a:ext uri="{28A0092B-C50C-407E-A947-70E740481C1C}">
+                <a14:useLocalDpi xmlns:a14="http://schemas.microsoft.com/office/drawing/2010/main" val="0"/>
+              </a:ext>
+            </a:extLst>
+          </a:blip>
+          <a:srcRect r="162" b="50186"/>
+          <a:stretch>
+            <a:fillRect/>
+          </a:stretch>
+        </p:blipFill>
+        <p:spPr>
+          <a:xfrm>
+            <a:off x="92432" y="2010020"/>
+            <a:ext cx="6003568" cy="3654989"/>
+          </a:xfrm>
+        </p:spPr>
+      </p:pic>
+      <p:pic>
+        <p:nvPicPr>
+          <p:cNvPr id="7" name="Immagine 6" descr="Immagine che contiene testo, schermata, numero, Parallelo&#10;&#10;Il contenuto generato dall'IA potrebbe non essere corretto.">
+            <a:extLst>
+              <a:ext uri="{FF2B5EF4-FFF2-40B4-BE49-F238E27FC236}">
+                <a16:creationId xmlns:a16="http://schemas.microsoft.com/office/drawing/2014/main" id="{A9A21FE3-E468-1981-E670-C16E71EC70D3}"/>
+              </a:ext>
+            </a:extLst>
+          </p:cNvPr>
+          <p:cNvPicPr>
+            <a:picLocks noChangeAspect="1"/>
+          </p:cNvPicPr>
+          <p:nvPr/>
+        </p:nvPicPr>
+        <p:blipFill>
+          <a:blip r:embed="rId2">
+            <a:extLst>
+              <a:ext uri="{28A0092B-C50C-407E-A947-70E740481C1C}">
+                <a14:useLocalDpi xmlns:a14="http://schemas.microsoft.com/office/drawing/2010/main" val="0"/>
+              </a:ext>
+            </a:extLst>
+          </a:blip>
+          <a:srcRect t="52106" r="-1110"/>
+          <a:stretch>
+            <a:fillRect/>
+          </a:stretch>
+        </p:blipFill>
+        <p:spPr>
+          <a:xfrm>
+            <a:off x="6121818" y="2179212"/>
+            <a:ext cx="6070182" cy="3508409"/>
+          </a:xfrm>
+          <a:prstGeom prst="rect">
+            <a:avLst/>
+          </a:prstGeom>
+        </p:spPr>
+      </p:pic>
+      <p:pic>
+        <p:nvPicPr>
+          <p:cNvPr id="9" name="Immagine 8" descr="Immagine che contiene testo, schermata, numero, Parallelo&#10;&#10;Il contenuto generato dall'IA potrebbe non essere corretto.">
+            <a:extLst>
+              <a:ext uri="{FF2B5EF4-FFF2-40B4-BE49-F238E27FC236}">
+                <a16:creationId xmlns:a16="http://schemas.microsoft.com/office/drawing/2014/main" id="{3E570714-E432-5201-88FE-D16491C425C3}"/>
+              </a:ext>
+            </a:extLst>
+          </p:cNvPr>
+          <p:cNvPicPr>
+            <a:picLocks noChangeAspect="1"/>
+          </p:cNvPicPr>
+          <p:nvPr/>
+        </p:nvPicPr>
+        <p:blipFill>
+          <a:blip r:embed="rId2">
+            <a:extLst>
+              <a:ext uri="{28A0092B-C50C-407E-A947-70E740481C1C}">
+                <a14:useLocalDpi xmlns:a14="http://schemas.microsoft.com/office/drawing/2010/main" val="0"/>
+              </a:ext>
+            </a:extLst>
+          </a:blip>
+          <a:srcRect b="96912"/>
+          <a:stretch>
+            <a:fillRect/>
+          </a:stretch>
+        </p:blipFill>
+        <p:spPr>
+          <a:xfrm>
+            <a:off x="6121818" y="2005557"/>
+            <a:ext cx="5977750" cy="211755"/>
+          </a:xfrm>
+          <a:prstGeom prst="rect">
+            <a:avLst/>
+          </a:prstGeom>
+        </p:spPr>
+      </p:pic>
     </p:spTree>
     <p:extLst>
       <p:ext uri="{BB962C8B-B14F-4D97-AF65-F5344CB8AC3E}">
-        <p14:creationId xmlns:p14="http://schemas.microsoft.com/office/powerpoint/2010/main" val="3569243125"/>
+        <p14:creationId xmlns:p14="http://schemas.microsoft.com/office/powerpoint/2010/main" val="913370226"/>
+      </p:ext>
+    </p:extLst>
+  </p:cSld>
+  <p:clrMapOvr>
+    <a:masterClrMapping/>
+  </p:clrMapOvr>
+</p:sld>
+</file>
+
+<file path=ppt/slides/slide17.xml><?xml version="1.0" encoding="utf-8"?>
+<p:sld xmlns:a="http://schemas.openxmlformats.org/drawingml/2006/main" xmlns:r="http://schemas.openxmlformats.org/officeDocument/2006/relationships" xmlns:p="http://schemas.openxmlformats.org/presentationml/2006/main">
+  <p:cSld>
+    <p:spTree>
+      <p:nvGrpSpPr>
+        <p:cNvPr id="1" name=""/>
+        <p:cNvGrpSpPr/>
+        <p:nvPr/>
+      </p:nvGrpSpPr>
+      <p:grpSpPr>
+        <a:xfrm>
+          <a:off x="0" y="0"/>
+          <a:ext cx="0" cy="0"/>
+          <a:chOff x="0" y="0"/>
+          <a:chExt cx="0" cy="0"/>
+        </a:xfrm>
+      </p:grpSpPr>
+      <p:sp>
+        <p:nvSpPr>
+          <p:cNvPr id="2" name="Titolo 1">
+            <a:extLst>
+              <a:ext uri="{FF2B5EF4-FFF2-40B4-BE49-F238E27FC236}">
+                <a16:creationId xmlns:a16="http://schemas.microsoft.com/office/drawing/2014/main" id="{03AF67B2-7F42-4C05-13B6-AF8D3BF28607}"/>
+              </a:ext>
+            </a:extLst>
+          </p:cNvPr>
+          <p:cNvSpPr>
+            <a:spLocks noGrp="1"/>
+          </p:cNvSpPr>
+          <p:nvPr>
+            <p:ph type="title"/>
+          </p:nvPr>
+        </p:nvSpPr>
+        <p:spPr/>
+        <p:txBody>
+          <a:bodyPr/>
+          <a:lstStyle/>
+          <a:p>
+            <a:r>
+              <a:rPr lang="en-US" dirty="0"/>
+              <a:t>RISULTATI QUALITATIVI</a:t>
+            </a:r>
+            <a:endParaRPr lang="it-IT" dirty="0"/>
+          </a:p>
+        </p:txBody>
+      </p:sp>
+      <p:pic>
+        <p:nvPicPr>
+          <p:cNvPr id="5" name="Segnaposto contenuto 4" descr="Immagine che contiene Foglio di alluminio, lamina/finta, Sacchetto di plastica, interno&#10;&#10;Il contenuto generato dall'IA potrebbe non essere corretto.">
+            <a:extLst>
+              <a:ext uri="{FF2B5EF4-FFF2-40B4-BE49-F238E27FC236}">
+                <a16:creationId xmlns:a16="http://schemas.microsoft.com/office/drawing/2014/main" id="{319BA228-2A9D-749D-114C-3D2F40F23EBF}"/>
+              </a:ext>
+            </a:extLst>
+          </p:cNvPr>
+          <p:cNvPicPr>
+            <a:picLocks noGrp="1" noChangeAspect="1"/>
+          </p:cNvPicPr>
+          <p:nvPr>
+            <p:ph idx="1"/>
+          </p:nvPr>
+        </p:nvPicPr>
+        <p:blipFill>
+          <a:blip r:embed="rId2">
+            <a:extLst>
+              <a:ext uri="{28A0092B-C50C-407E-A947-70E740481C1C}">
+                <a14:useLocalDpi xmlns:a14="http://schemas.microsoft.com/office/drawing/2010/main" val="0"/>
+              </a:ext>
+            </a:extLst>
+          </a:blip>
+          <a:stretch>
+            <a:fillRect/>
+          </a:stretch>
+        </p:blipFill>
+        <p:spPr>
+          <a:xfrm>
+            <a:off x="128861" y="1991767"/>
+            <a:ext cx="5967139" cy="3442580"/>
+          </a:xfrm>
+        </p:spPr>
+      </p:pic>
+      <p:pic>
+        <p:nvPicPr>
+          <p:cNvPr id="7" name="Immagine 6" descr="Immagine che contiene Foglio di alluminio, lamina/finta, Sacchetto di plastica, interno&#10;&#10;Il contenuto generato dall'IA potrebbe non essere corretto.">
+            <a:extLst>
+              <a:ext uri="{FF2B5EF4-FFF2-40B4-BE49-F238E27FC236}">
+                <a16:creationId xmlns:a16="http://schemas.microsoft.com/office/drawing/2014/main" id="{FDB52E75-D243-B0A7-0381-F71E729186CD}"/>
+              </a:ext>
+            </a:extLst>
+          </p:cNvPr>
+          <p:cNvPicPr>
+            <a:picLocks noChangeAspect="1"/>
+          </p:cNvPicPr>
+          <p:nvPr/>
+        </p:nvPicPr>
+        <p:blipFill>
+          <a:blip r:embed="rId3">
+            <a:extLst>
+              <a:ext uri="{28A0092B-C50C-407E-A947-70E740481C1C}">
+                <a14:useLocalDpi xmlns:a14="http://schemas.microsoft.com/office/drawing/2010/main" val="0"/>
+              </a:ext>
+            </a:extLst>
+          </a:blip>
+          <a:stretch>
+            <a:fillRect/>
+          </a:stretch>
+        </p:blipFill>
+        <p:spPr>
+          <a:xfrm>
+            <a:off x="6182610" y="1991767"/>
+            <a:ext cx="5967139" cy="3442580"/>
+          </a:xfrm>
+          <a:prstGeom prst="rect">
+            <a:avLst/>
+          </a:prstGeom>
+        </p:spPr>
+      </p:pic>
+      <p:sp>
+        <p:nvSpPr>
+          <p:cNvPr id="8" name="CasellaDiTesto 7">
+            <a:extLst>
+              <a:ext uri="{FF2B5EF4-FFF2-40B4-BE49-F238E27FC236}">
+                <a16:creationId xmlns:a16="http://schemas.microsoft.com/office/drawing/2014/main" id="{2B6C4A00-1063-CAF7-4F4D-59401C353FA6}"/>
+              </a:ext>
+            </a:extLst>
+          </p:cNvPr>
+          <p:cNvSpPr txBox="1"/>
+          <p:nvPr/>
+        </p:nvSpPr>
+        <p:spPr>
+          <a:xfrm>
+            <a:off x="128861" y="5615013"/>
+            <a:ext cx="5967139" cy="369332"/>
+          </a:xfrm>
+          <a:prstGeom prst="rect">
+            <a:avLst/>
+          </a:prstGeom>
+          <a:noFill/>
+        </p:spPr>
+        <p:txBody>
+          <a:bodyPr wrap="square" rtlCol="0">
+            <a:spAutoFit/>
+          </a:bodyPr>
+          <a:lstStyle/>
+          <a:p>
+            <a:pPr algn="ctr"/>
+            <a:r>
+              <a:rPr lang="en-US" dirty="0" err="1"/>
+              <a:t>Immagine</a:t>
+            </a:r>
+            <a:r>
+              <a:rPr lang="en-US" dirty="0"/>
+              <a:t> pre-tuning</a:t>
+            </a:r>
+            <a:endParaRPr lang="it-IT" dirty="0"/>
+          </a:p>
+        </p:txBody>
+      </p:sp>
+      <p:sp>
+        <p:nvSpPr>
+          <p:cNvPr id="9" name="CasellaDiTesto 8">
+            <a:extLst>
+              <a:ext uri="{FF2B5EF4-FFF2-40B4-BE49-F238E27FC236}">
+                <a16:creationId xmlns:a16="http://schemas.microsoft.com/office/drawing/2014/main" id="{46277846-57BA-482D-AAC2-A768BCB71461}"/>
+              </a:ext>
+            </a:extLst>
+          </p:cNvPr>
+          <p:cNvSpPr txBox="1"/>
+          <p:nvPr/>
+        </p:nvSpPr>
+        <p:spPr>
+          <a:xfrm>
+            <a:off x="6182609" y="5615013"/>
+            <a:ext cx="5967139" cy="369332"/>
+          </a:xfrm>
+          <a:prstGeom prst="rect">
+            <a:avLst/>
+          </a:prstGeom>
+          <a:noFill/>
+        </p:spPr>
+        <p:txBody>
+          <a:bodyPr wrap="square" rtlCol="0">
+            <a:spAutoFit/>
+          </a:bodyPr>
+          <a:lstStyle/>
+          <a:p>
+            <a:pPr algn="ctr"/>
+            <a:r>
+              <a:rPr lang="en-US" dirty="0" err="1"/>
+              <a:t>Immagine</a:t>
+            </a:r>
+            <a:r>
+              <a:rPr lang="en-US" dirty="0"/>
+              <a:t> post-tuning</a:t>
+            </a:r>
+            <a:endParaRPr lang="it-IT" dirty="0"/>
+          </a:p>
+        </p:txBody>
+      </p:sp>
+    </p:spTree>
+    <p:extLst>
+      <p:ext uri="{BB962C8B-B14F-4D97-AF65-F5344CB8AC3E}">
+        <p14:creationId xmlns:p14="http://schemas.microsoft.com/office/powerpoint/2010/main" val="2807962207"/>
+      </p:ext>
+    </p:extLst>
+  </p:cSld>
+  <p:clrMapOvr>
+    <a:masterClrMapping/>
+  </p:clrMapOvr>
+</p:sld>
+</file>
+
+<file path=ppt/slides/slide18.xml><?xml version="1.0" encoding="utf-8"?>
+<p:sld xmlns:a="http://schemas.openxmlformats.org/drawingml/2006/main" xmlns:r="http://schemas.openxmlformats.org/officeDocument/2006/relationships" xmlns:p="http://schemas.openxmlformats.org/presentationml/2006/main">
+  <p:cSld>
+    <p:spTree>
+      <p:nvGrpSpPr>
+        <p:cNvPr id="1" name=""/>
+        <p:cNvGrpSpPr/>
+        <p:nvPr/>
+      </p:nvGrpSpPr>
+      <p:grpSpPr>
+        <a:xfrm>
+          <a:off x="0" y="0"/>
+          <a:ext cx="0" cy="0"/>
+          <a:chOff x="0" y="0"/>
+          <a:chExt cx="0" cy="0"/>
+        </a:xfrm>
+      </p:grpSpPr>
+      <p:sp>
+        <p:nvSpPr>
+          <p:cNvPr id="2" name="Titolo 1">
+            <a:extLst>
+              <a:ext uri="{FF2B5EF4-FFF2-40B4-BE49-F238E27FC236}">
+                <a16:creationId xmlns:a16="http://schemas.microsoft.com/office/drawing/2014/main" id="{ED3F7A22-5EB0-C121-9F4D-98ED7D4AB1A6}"/>
+              </a:ext>
+            </a:extLst>
+          </p:cNvPr>
+          <p:cNvSpPr>
+            <a:spLocks noGrp="1"/>
+          </p:cNvSpPr>
+          <p:nvPr>
+            <p:ph type="title"/>
+          </p:nvPr>
+        </p:nvSpPr>
+        <p:spPr/>
+        <p:txBody>
+          <a:bodyPr/>
+          <a:lstStyle/>
+          <a:p>
+            <a:r>
+              <a:rPr lang="en-US" dirty="0"/>
+              <a:t>RISULTATI QUANTITATIVI ALLUMINIO</a:t>
+            </a:r>
+            <a:endParaRPr lang="it-IT" dirty="0"/>
+          </a:p>
+        </p:txBody>
+      </p:sp>
+      <p:pic>
+        <p:nvPicPr>
+          <p:cNvPr id="5" name="Segnaposto contenuto 4">
+            <a:extLst>
+              <a:ext uri="{FF2B5EF4-FFF2-40B4-BE49-F238E27FC236}">
+                <a16:creationId xmlns:a16="http://schemas.microsoft.com/office/drawing/2014/main" id="{331ACC1A-4AAD-B9A1-290F-22BFAFA4C32C}"/>
+              </a:ext>
+            </a:extLst>
+          </p:cNvPr>
+          <p:cNvPicPr>
+            <a:picLocks noGrp="1" noChangeAspect="1"/>
+          </p:cNvPicPr>
+          <p:nvPr>
+            <p:ph idx="1"/>
+          </p:nvPr>
+        </p:nvPicPr>
+        <p:blipFill>
+          <a:blip r:embed="rId2">
+            <a:extLst>
+              <a:ext uri="{28A0092B-C50C-407E-A947-70E740481C1C}">
+                <a14:useLocalDpi xmlns:a14="http://schemas.microsoft.com/office/drawing/2010/main" val="0"/>
+              </a:ext>
+            </a:extLst>
+          </a:blip>
+          <a:stretch>
+            <a:fillRect/>
+          </a:stretch>
+        </p:blipFill>
+        <p:spPr>
+          <a:xfrm>
+            <a:off x="182880" y="3330341"/>
+            <a:ext cx="11564936" cy="1386658"/>
+          </a:xfrm>
+        </p:spPr>
+      </p:pic>
+    </p:spTree>
+    <p:extLst>
+      <p:ext uri="{BB962C8B-B14F-4D97-AF65-F5344CB8AC3E}">
+        <p14:creationId xmlns:p14="http://schemas.microsoft.com/office/powerpoint/2010/main" val="75476972"/>
+      </p:ext>
+    </p:extLst>
+  </p:cSld>
+  <p:clrMapOvr>
+    <a:masterClrMapping/>
+  </p:clrMapOvr>
+</p:sld>
+</file>
+
+<file path=ppt/slides/slide19.xml><?xml version="1.0" encoding="utf-8"?>
+<p:sld xmlns:a="http://schemas.openxmlformats.org/drawingml/2006/main" xmlns:r="http://schemas.openxmlformats.org/officeDocument/2006/relationships" xmlns:p="http://schemas.openxmlformats.org/presentationml/2006/main">
+  <p:cSld>
+    <p:spTree>
+      <p:nvGrpSpPr>
+        <p:cNvPr id="1" name=""/>
+        <p:cNvGrpSpPr/>
+        <p:nvPr/>
+      </p:nvGrpSpPr>
+      <p:grpSpPr>
+        <a:xfrm>
+          <a:off x="0" y="0"/>
+          <a:ext cx="0" cy="0"/>
+          <a:chOff x="0" y="0"/>
+          <a:chExt cx="0" cy="0"/>
+        </a:xfrm>
+      </p:grpSpPr>
+      <p:sp>
+        <p:nvSpPr>
+          <p:cNvPr id="2" name="Titolo 1">
+            <a:extLst>
+              <a:ext uri="{FF2B5EF4-FFF2-40B4-BE49-F238E27FC236}">
+                <a16:creationId xmlns:a16="http://schemas.microsoft.com/office/drawing/2014/main" id="{EB7DFE78-132B-44A2-6F7C-28B9B4E998F4}"/>
+              </a:ext>
+            </a:extLst>
+          </p:cNvPr>
+          <p:cNvSpPr>
+            <a:spLocks noGrp="1"/>
+          </p:cNvSpPr>
+          <p:nvPr>
+            <p:ph type="title"/>
+          </p:nvPr>
+        </p:nvSpPr>
+        <p:spPr/>
+        <p:txBody>
+          <a:bodyPr/>
+          <a:lstStyle/>
+          <a:p>
+            <a:r>
+              <a:rPr lang="en-US" dirty="0"/>
+              <a:t>CONCLUSIONE</a:t>
+            </a:r>
+            <a:endParaRPr lang="it-IT" dirty="0"/>
+          </a:p>
+        </p:txBody>
+      </p:sp>
+      <p:sp>
+        <p:nvSpPr>
+          <p:cNvPr id="3" name="Segnaposto contenuto 2">
+            <a:extLst>
+              <a:ext uri="{FF2B5EF4-FFF2-40B4-BE49-F238E27FC236}">
+                <a16:creationId xmlns:a16="http://schemas.microsoft.com/office/drawing/2014/main" id="{9FF9DDDC-ACFF-1D33-157E-A989F239CF9E}"/>
+              </a:ext>
+            </a:extLst>
+          </p:cNvPr>
+          <p:cNvSpPr>
+            <a:spLocks noGrp="1"/>
+          </p:cNvSpPr>
+          <p:nvPr>
+            <p:ph idx="1"/>
+          </p:nvPr>
+        </p:nvSpPr>
+        <p:spPr/>
+        <p:txBody>
+          <a:bodyPr/>
+          <a:lstStyle/>
+          <a:p>
+            <a:pPr eaLnBrk="0" fontAlgn="base" hangingPunct="0">
+              <a:lnSpc>
+                <a:spcPct val="100000"/>
+              </a:lnSpc>
+              <a:spcBef>
+                <a:spcPct val="0"/>
+              </a:spcBef>
+              <a:spcAft>
+                <a:spcPct val="0"/>
+              </a:spcAft>
+            </a:pPr>
+            <a:r>
+              <a:rPr lang="it-IT" altLang="it-IT" dirty="0">
+                <a:latin typeface="Arial" panose="020B0604020202020204" pitchFamily="34" charset="0"/>
+              </a:rPr>
+              <a:t>Metriche leggermente migliorate, partendo dall'ottima    performance del modello </a:t>
+            </a:r>
+            <a:r>
+              <a:rPr lang="it-IT" altLang="it-IT" dirty="0" err="1">
+                <a:latin typeface="Arial" panose="020B0604020202020204" pitchFamily="34" charset="0"/>
+              </a:rPr>
+              <a:t>pre</a:t>
+            </a:r>
+            <a:r>
+              <a:rPr lang="it-IT" altLang="it-IT" dirty="0">
+                <a:latin typeface="Arial" panose="020B0604020202020204" pitchFamily="34" charset="0"/>
+              </a:rPr>
+              <a:t>-addestrato.</a:t>
+            </a:r>
+          </a:p>
+          <a:p>
+            <a:pPr marL="0" lvl="0" indent="0" eaLnBrk="0" fontAlgn="base" hangingPunct="0">
+              <a:lnSpc>
+                <a:spcPct val="100000"/>
+              </a:lnSpc>
+              <a:spcBef>
+                <a:spcPct val="0"/>
+              </a:spcBef>
+              <a:spcAft>
+                <a:spcPct val="0"/>
+              </a:spcAft>
+              <a:buNone/>
+            </a:pPr>
+            <a:endParaRPr lang="it-IT" altLang="it-IT" dirty="0">
+              <a:latin typeface="Arial" panose="020B0604020202020204" pitchFamily="34" charset="0"/>
+            </a:endParaRPr>
+          </a:p>
+          <a:p>
+            <a:pPr eaLnBrk="0" fontAlgn="base" hangingPunct="0">
+              <a:lnSpc>
+                <a:spcPct val="100000"/>
+              </a:lnSpc>
+              <a:spcBef>
+                <a:spcPct val="0"/>
+              </a:spcBef>
+              <a:spcAft>
+                <a:spcPct val="0"/>
+              </a:spcAft>
+            </a:pPr>
+            <a:r>
+              <a:rPr lang="it-IT" altLang="it-IT" dirty="0">
+                <a:latin typeface="Arial" panose="020B0604020202020204" pitchFamily="34" charset="0"/>
+              </a:rPr>
+              <a:t>Ulteriori miglioramenti possibili aumentando il dataset di fine-  tuning. </a:t>
+            </a:r>
+          </a:p>
+          <a:p>
+            <a:pPr marL="0" lvl="0" indent="0" eaLnBrk="0" fontAlgn="base" hangingPunct="0">
+              <a:lnSpc>
+                <a:spcPct val="100000"/>
+              </a:lnSpc>
+              <a:spcBef>
+                <a:spcPct val="0"/>
+              </a:spcBef>
+              <a:spcAft>
+                <a:spcPct val="0"/>
+              </a:spcAft>
+              <a:buNone/>
+            </a:pPr>
+            <a:endParaRPr lang="it-IT" altLang="it-IT" dirty="0">
+              <a:latin typeface="Arial" panose="020B0604020202020204" pitchFamily="34" charset="0"/>
+            </a:endParaRPr>
+          </a:p>
+          <a:p>
+            <a:pPr eaLnBrk="0" fontAlgn="base" hangingPunct="0">
+              <a:lnSpc>
+                <a:spcPct val="100000"/>
+              </a:lnSpc>
+              <a:spcBef>
+                <a:spcPct val="0"/>
+              </a:spcBef>
+              <a:spcAft>
+                <a:spcPct val="0"/>
+              </a:spcAft>
+            </a:pPr>
+            <a:r>
+              <a:rPr lang="it-IT" dirty="0"/>
+              <a:t>Risultati superiori in quasi tutte le metriche se si esclude l'area non </a:t>
+            </a:r>
+            <a:r>
+              <a:rPr lang="it-IT" dirty="0" err="1"/>
+              <a:t>lambertiana</a:t>
+            </a:r>
+            <a:r>
+              <a:rPr lang="it-IT" dirty="0"/>
+              <a:t>.</a:t>
+            </a:r>
+            <a:endParaRPr lang="it-IT" altLang="it-IT" dirty="0">
+              <a:latin typeface="Arial" panose="020B0604020202020204" pitchFamily="34" charset="0"/>
+            </a:endParaRPr>
+          </a:p>
+          <a:p>
+            <a:endParaRPr lang="it-IT" dirty="0"/>
+          </a:p>
+        </p:txBody>
+      </p:sp>
+    </p:spTree>
+    <p:extLst>
+      <p:ext uri="{BB962C8B-B14F-4D97-AF65-F5344CB8AC3E}">
+        <p14:creationId xmlns:p14="http://schemas.microsoft.com/office/powerpoint/2010/main" val="837475576"/>
       </p:ext>
     </p:extLst>
   </p:cSld>
@@ -4541,6 +5074,161 @@
     <p:extLst>
       <p:ext uri="{BB962C8B-B14F-4D97-AF65-F5344CB8AC3E}">
         <p14:creationId xmlns:p14="http://schemas.microsoft.com/office/powerpoint/2010/main" val="4006061324"/>
+      </p:ext>
+    </p:extLst>
+  </p:cSld>
+  <p:clrMapOvr>
+    <a:masterClrMapping/>
+  </p:clrMapOvr>
+</p:sld>
+</file>
+
+<file path=ppt/slides/slide20.xml><?xml version="1.0" encoding="utf-8"?>
+<p:sld xmlns:a="http://schemas.openxmlformats.org/drawingml/2006/main" xmlns:r="http://schemas.openxmlformats.org/officeDocument/2006/relationships" xmlns:p="http://schemas.openxmlformats.org/presentationml/2006/main">
+  <p:cSld>
+    <p:spTree>
+      <p:nvGrpSpPr>
+        <p:cNvPr id="1" name=""/>
+        <p:cNvGrpSpPr/>
+        <p:nvPr/>
+      </p:nvGrpSpPr>
+      <p:grpSpPr>
+        <a:xfrm>
+          <a:off x="0" y="0"/>
+          <a:ext cx="0" cy="0"/>
+          <a:chOff x="0" y="0"/>
+          <a:chExt cx="0" cy="0"/>
+        </a:xfrm>
+      </p:grpSpPr>
+      <p:sp>
+        <p:nvSpPr>
+          <p:cNvPr id="2" name="Titolo 1">
+            <a:extLst>
+              <a:ext uri="{FF2B5EF4-FFF2-40B4-BE49-F238E27FC236}">
+                <a16:creationId xmlns:a16="http://schemas.microsoft.com/office/drawing/2014/main" id="{FE90BB19-32AB-57C3-5FC0-A0E01336BA97}"/>
+              </a:ext>
+            </a:extLst>
+          </p:cNvPr>
+          <p:cNvSpPr>
+            <a:spLocks noGrp="1"/>
+          </p:cNvSpPr>
+          <p:nvPr>
+            <p:ph type="title"/>
+          </p:nvPr>
+        </p:nvSpPr>
+        <p:spPr/>
+        <p:txBody>
+          <a:bodyPr/>
+          <a:lstStyle/>
+          <a:p>
+            <a:r>
+              <a:rPr lang="en-US" dirty="0" err="1"/>
+              <a:t>Bibliografia</a:t>
+            </a:r>
+            <a:endParaRPr lang="it-IT" dirty="0"/>
+          </a:p>
+        </p:txBody>
+      </p:sp>
+      <p:sp>
+        <p:nvSpPr>
+          <p:cNvPr id="3" name="Segnaposto contenuto 2">
+            <a:extLst>
+              <a:ext uri="{FF2B5EF4-FFF2-40B4-BE49-F238E27FC236}">
+                <a16:creationId xmlns:a16="http://schemas.microsoft.com/office/drawing/2014/main" id="{50DAF559-DD37-A7C0-60EC-129E30133D07}"/>
+              </a:ext>
+            </a:extLst>
+          </p:cNvPr>
+          <p:cNvSpPr>
+            <a:spLocks noGrp="1"/>
+          </p:cNvSpPr>
+          <p:nvPr>
+            <p:ph idx="1"/>
+          </p:nvPr>
+        </p:nvSpPr>
+        <p:spPr/>
+        <p:txBody>
+          <a:bodyPr/>
+          <a:lstStyle/>
+          <a:p>
+            <a:r>
+              <a:rPr lang="it-IT" dirty="0"/>
+              <a:t>Yang, </a:t>
+            </a:r>
+            <a:r>
+              <a:rPr lang="it-IT" dirty="0" err="1"/>
+              <a:t>Yixin</a:t>
+            </a:r>
+            <a:r>
+              <a:rPr lang="it-IT" dirty="0"/>
+              <a:t>, et al. "</a:t>
+            </a:r>
+            <a:r>
+              <a:rPr lang="it-IT" dirty="0" err="1"/>
+              <a:t>ColorMNet</a:t>
+            </a:r>
+            <a:r>
+              <a:rPr lang="it-IT" dirty="0"/>
+              <a:t>: A </a:t>
+            </a:r>
+            <a:r>
+              <a:rPr lang="it-IT" dirty="0" err="1"/>
+              <a:t>memory-based</a:t>
+            </a:r>
+            <a:r>
+              <a:rPr lang="it-IT" dirty="0"/>
+              <a:t> deep </a:t>
+            </a:r>
+            <a:r>
+              <a:rPr lang="it-IT" dirty="0" err="1"/>
+              <a:t>spatial-temporal</a:t>
+            </a:r>
+            <a:r>
+              <a:rPr lang="it-IT" dirty="0"/>
+              <a:t> feature </a:t>
+            </a:r>
+            <a:r>
+              <a:rPr lang="it-IT" dirty="0" err="1"/>
+              <a:t>propagation</a:t>
+            </a:r>
+            <a:r>
+              <a:rPr lang="it-IT" dirty="0"/>
+              <a:t> network for video </a:t>
+            </a:r>
+            <a:r>
+              <a:rPr lang="it-IT" dirty="0" err="1"/>
+              <a:t>colorization</a:t>
+            </a:r>
+            <a:r>
+              <a:rPr lang="it-IT" dirty="0"/>
+              <a:t>." </a:t>
+            </a:r>
+            <a:r>
+              <a:rPr lang="it-IT" i="1" dirty="0" err="1"/>
+              <a:t>European</a:t>
+            </a:r>
+            <a:r>
+              <a:rPr lang="it-IT" i="1" dirty="0"/>
+              <a:t> Conference on Computer Vision</a:t>
+            </a:r>
+            <a:r>
+              <a:rPr lang="it-IT" dirty="0"/>
+              <a:t>. Cham: Springer Nature </a:t>
+            </a:r>
+            <a:r>
+              <a:rPr lang="it-IT" dirty="0" err="1"/>
+              <a:t>Switzerland</a:t>
+            </a:r>
+            <a:r>
+              <a:rPr lang="it-IT" dirty="0"/>
+              <a:t>, 2024.</a:t>
+            </a:r>
+          </a:p>
+        </p:txBody>
+      </p:sp>
+    </p:spTree>
+    <p:extLst>
+      <p:ext uri="{BB962C8B-B14F-4D97-AF65-F5344CB8AC3E}">
+        <p14:creationId xmlns:p14="http://schemas.microsoft.com/office/powerpoint/2010/main" val="3569243125"/>
       </p:ext>
     </p:extLst>
   </p:cSld>

</xml_diff>